<commit_message>
update slides with calebs comments
</commit_message>
<xml_diff>
--- a/resources/hw/genomic-data-visualization-HW_0.pptx
+++ b/resources/hw/genomic-data-visualization-HW_0.pptx
@@ -4124,11 +4124,11 @@
               <a:rPr lang="en-US" dirty="0">
                 <a:hlinkClick r:id="rId2"/>
               </a:rPr>
-              <a:t>https://github.com/JEFworks-Lab/genomic-data-visualization-2024</a:t>
+              <a:t>https://github.com/JEFworks-Lab/genomic-data-visualization-2025</a:t>
             </a:r>
             <a:r>
               <a:rPr lang="en-US" dirty="0"/>
-              <a:t>   </a:t>
+              <a:t>    </a:t>
             </a:r>
           </a:p>
         </p:txBody>
@@ -4440,6 +4440,110 @@
           </a:p>
         </p:txBody>
       </p:sp>
+      <p:sp>
+        <p:nvSpPr>
+          <p:cNvPr id="3" name="TextBox 2">
+            <a:extLst>
+              <a:ext uri="{FF2B5EF4-FFF2-40B4-BE49-F238E27FC236}">
+                <a16:creationId xmlns:a16="http://schemas.microsoft.com/office/drawing/2014/main" id="{8A44EE73-C264-7ADD-92C1-00D6C15AF82A}"/>
+              </a:ext>
+            </a:extLst>
+          </p:cNvPr>
+          <p:cNvSpPr txBox="1"/>
+          <p:nvPr/>
+        </p:nvSpPr>
+        <p:spPr>
+          <a:xfrm>
+            <a:off x="178711" y="4256411"/>
+            <a:ext cx="4296872" cy="2308324"/>
+          </a:xfrm>
+          <a:prstGeom prst="rect">
+            <a:avLst/>
+          </a:prstGeom>
+          <a:noFill/>
+        </p:spPr>
+        <p:txBody>
+          <a:bodyPr wrap="square" rtlCol="0">
+            <a:spAutoFit/>
+          </a:bodyPr>
+          <a:lstStyle/>
+          <a:p>
+            <a:r>
+              <a:rPr lang="en-US" dirty="0"/>
+              <a:t>An easy way to do this is using the command line. Copy the ssh text here, and in the command line (in a location you want to create this folder) type:</a:t>
+            </a:r>
+          </a:p>
+          <a:p>
+            <a:r>
+              <a:rPr lang="en-US" dirty="0">
+                <a:latin typeface="Consolas" panose="020B0609020204030204" pitchFamily="49" charset="0"/>
+                <a:cs typeface="Consolas" panose="020B0609020204030204" pitchFamily="49" charset="0"/>
+              </a:rPr>
+              <a:t>git clone [paste ssh text]</a:t>
+            </a:r>
+          </a:p>
+          <a:p>
+            <a:endParaRPr lang="en-US" dirty="0">
+              <a:latin typeface="Consolas" panose="020B0609020204030204" pitchFamily="49" charset="0"/>
+              <a:cs typeface="Consolas" panose="020B0609020204030204" pitchFamily="49" charset="0"/>
+            </a:endParaRPr>
+          </a:p>
+          <a:p>
+            <a:r>
+              <a:rPr lang="en-US" dirty="0"/>
+              <a:t>This will copy (or clone) the entire GitHub repo to your local machine. </a:t>
+            </a:r>
+            <a:endParaRPr lang="en-US" dirty="0">
+              <a:latin typeface="Consolas" panose="020B0609020204030204" pitchFamily="49" charset="0"/>
+              <a:cs typeface="Consolas" panose="020B0609020204030204" pitchFamily="49" charset="0"/>
+            </a:endParaRPr>
+          </a:p>
+        </p:txBody>
+      </p:sp>
+      <p:cxnSp>
+        <p:nvCxnSpPr>
+          <p:cNvPr id="8" name="Straight Arrow Connector 7">
+            <a:extLst>
+              <a:ext uri="{FF2B5EF4-FFF2-40B4-BE49-F238E27FC236}">
+                <a16:creationId xmlns:a16="http://schemas.microsoft.com/office/drawing/2014/main" id="{6FAEB8CB-A568-DC17-B8F3-3B2CE125C1DC}"/>
+              </a:ext>
+            </a:extLst>
+          </p:cNvPr>
+          <p:cNvCxnSpPr>
+            <a:cxnSpLocks/>
+          </p:cNvCxnSpPr>
+          <p:nvPr/>
+        </p:nvCxnSpPr>
+        <p:spPr>
+          <a:xfrm flipV="1">
+            <a:off x="3738520" y="2338598"/>
+            <a:ext cx="5810082" cy="2290046"/>
+          </a:xfrm>
+          <a:prstGeom prst="straightConnector1">
+            <a:avLst/>
+          </a:prstGeom>
+          <a:ln>
+            <a:solidFill>
+              <a:srgbClr val="FF0000"/>
+            </a:solidFill>
+            <a:tailEnd type="triangle"/>
+          </a:ln>
+        </p:spPr>
+        <p:style>
+          <a:lnRef idx="3">
+            <a:schemeClr val="accent1"/>
+          </a:lnRef>
+          <a:fillRef idx="0">
+            <a:schemeClr val="accent1"/>
+          </a:fillRef>
+          <a:effectRef idx="2">
+            <a:schemeClr val="accent1"/>
+          </a:effectRef>
+          <a:fontRef idx="minor">
+            <a:schemeClr val="tx1"/>
+          </a:fontRef>
+        </p:style>
+      </p:cxnSp>
     </p:spTree>
     <p:extLst>
       <p:ext uri="{BB962C8B-B14F-4D97-AF65-F5344CB8AC3E}">

</xml_diff>